<commit_message>
work on the chapter 3 regression
</commit_message>
<xml_diff>
--- a/Presentations/presentation_chapter1.pptx
+++ b/Presentations/presentation_chapter1.pptx
@@ -14988,7 +14988,7 @@
           <a:bodyPr/>
           <a:lstStyle/>
           <a:p>
-            <a:endParaRPr lang="en-US"/>
+            <a:endParaRPr lang="en-US" dirty="0"/>
           </a:p>
         </p:txBody>
       </p:sp>
@@ -16375,6 +16375,13 @@
   <p:clrMapOvr>
     <a:masterClrMapping/>
   </p:clrMapOvr>
+  <p:timing>
+    <p:tnLst>
+      <p:par>
+        <p:cTn id="1" dur="indefinite" restart="never" nodeType="tmRoot"/>
+      </p:par>
+    </p:tnLst>
+  </p:timing>
 </p:sld>
 </file>
 
@@ -17442,6 +17449,13 @@
   <p:clrMapOvr>
     <a:masterClrMapping/>
   </p:clrMapOvr>
+  <p:timing>
+    <p:tnLst>
+      <p:par>
+        <p:cTn id="1" dur="indefinite" restart="never" nodeType="tmRoot"/>
+      </p:par>
+    </p:tnLst>
+  </p:timing>
 </p:sld>
 </file>
 
@@ -17699,6 +17713,13 @@
   <p:clrMapOvr>
     <a:masterClrMapping/>
   </p:clrMapOvr>
+  <p:timing>
+    <p:tnLst>
+      <p:par>
+        <p:cTn id="1" dur="indefinite" restart="never" nodeType="tmRoot"/>
+      </p:par>
+    </p:tnLst>
+  </p:timing>
 </p:sld>
 </file>
 
@@ -19365,6 +19386,13 @@
   <p:clrMapOvr>
     <a:masterClrMapping/>
   </p:clrMapOvr>
+  <p:timing>
+    <p:tnLst>
+      <p:par>
+        <p:cTn id="1" dur="indefinite" restart="never" nodeType="tmRoot"/>
+      </p:par>
+    </p:tnLst>
+  </p:timing>
 </p:sld>
 </file>
 

</xml_diff>